<commit_message>
Updating slides on Docker and adding to index slide
</commit_message>
<xml_diff>
--- a/app/public/assets/02/docker-dev-and-prod.pptx
+++ b/app/public/assets/02/docker-dev-and-prod.pptx
@@ -104,6 +104,11 @@
       </a:defRPr>
     </a:lvl9pPr>
   </p:defaultTextStyle>
+  <p:extLst>
+    <p:ext uri="{EFAFB233-063F-42B5-8137-9DF3F51BA10A}">
+      <p15:sldGuideLst xmlns:p15="http://schemas.microsoft.com/office/powerpoint/2012/main"/>
+    </p:ext>
+  </p:extLst>
 </p:presentation>
 </file>
 
@@ -256,7 +261,7 @@
           <a:p>
             <a:fld id="{6E1A0613-6EBF-431F-A53F-186691F96B7D}" type="datetimeFigureOut">
               <a:rPr lang="en-BE" smtClean="0"/>
-              <a:t>14/09/2022</a:t>
+              <a:t>23/09/2023</a:t>
             </a:fld>
             <a:endParaRPr lang="en-BE"/>
           </a:p>
@@ -456,7 +461,7 @@
           <a:p>
             <a:fld id="{6E1A0613-6EBF-431F-A53F-186691F96B7D}" type="datetimeFigureOut">
               <a:rPr lang="en-BE" smtClean="0"/>
-              <a:t>14/09/2022</a:t>
+              <a:t>23/09/2023</a:t>
             </a:fld>
             <a:endParaRPr lang="en-BE"/>
           </a:p>
@@ -666,7 +671,7 @@
           <a:p>
             <a:fld id="{6E1A0613-6EBF-431F-A53F-186691F96B7D}" type="datetimeFigureOut">
               <a:rPr lang="en-BE" smtClean="0"/>
-              <a:t>14/09/2022</a:t>
+              <a:t>23/09/2023</a:t>
             </a:fld>
             <a:endParaRPr lang="en-BE"/>
           </a:p>
@@ -866,7 +871,7 @@
           <a:p>
             <a:fld id="{6E1A0613-6EBF-431F-A53F-186691F96B7D}" type="datetimeFigureOut">
               <a:rPr lang="en-BE" smtClean="0"/>
-              <a:t>14/09/2022</a:t>
+              <a:t>23/09/2023</a:t>
             </a:fld>
             <a:endParaRPr lang="en-BE"/>
           </a:p>
@@ -1142,7 +1147,7 @@
           <a:p>
             <a:fld id="{6E1A0613-6EBF-431F-A53F-186691F96B7D}" type="datetimeFigureOut">
               <a:rPr lang="en-BE" smtClean="0"/>
-              <a:t>14/09/2022</a:t>
+              <a:t>23/09/2023</a:t>
             </a:fld>
             <a:endParaRPr lang="en-BE"/>
           </a:p>
@@ -1410,7 +1415,7 @@
           <a:p>
             <a:fld id="{6E1A0613-6EBF-431F-A53F-186691F96B7D}" type="datetimeFigureOut">
               <a:rPr lang="en-BE" smtClean="0"/>
-              <a:t>14/09/2022</a:t>
+              <a:t>23/09/2023</a:t>
             </a:fld>
             <a:endParaRPr lang="en-BE"/>
           </a:p>
@@ -1825,7 +1830,7 @@
           <a:p>
             <a:fld id="{6E1A0613-6EBF-431F-A53F-186691F96B7D}" type="datetimeFigureOut">
               <a:rPr lang="en-BE" smtClean="0"/>
-              <a:t>14/09/2022</a:t>
+              <a:t>23/09/2023</a:t>
             </a:fld>
             <a:endParaRPr lang="en-BE"/>
           </a:p>
@@ -1967,7 +1972,7 @@
           <a:p>
             <a:fld id="{6E1A0613-6EBF-431F-A53F-186691F96B7D}" type="datetimeFigureOut">
               <a:rPr lang="en-BE" smtClean="0"/>
-              <a:t>14/09/2022</a:t>
+              <a:t>23/09/2023</a:t>
             </a:fld>
             <a:endParaRPr lang="en-BE"/>
           </a:p>
@@ -2080,7 +2085,7 @@
           <a:p>
             <a:fld id="{6E1A0613-6EBF-431F-A53F-186691F96B7D}" type="datetimeFigureOut">
               <a:rPr lang="en-BE" smtClean="0"/>
-              <a:t>14/09/2022</a:t>
+              <a:t>23/09/2023</a:t>
             </a:fld>
             <a:endParaRPr lang="en-BE"/>
           </a:p>
@@ -2393,7 +2398,7 @@
           <a:p>
             <a:fld id="{6E1A0613-6EBF-431F-A53F-186691F96B7D}" type="datetimeFigureOut">
               <a:rPr lang="en-BE" smtClean="0"/>
-              <a:t>14/09/2022</a:t>
+              <a:t>23/09/2023</a:t>
             </a:fld>
             <a:endParaRPr lang="en-BE"/>
           </a:p>
@@ -2682,7 +2687,7 @@
           <a:p>
             <a:fld id="{6E1A0613-6EBF-431F-A53F-186691F96B7D}" type="datetimeFigureOut">
               <a:rPr lang="en-BE" smtClean="0"/>
-              <a:t>14/09/2022</a:t>
+              <a:t>23/09/2023</a:t>
             </a:fld>
             <a:endParaRPr lang="en-BE"/>
           </a:p>
@@ -2925,7 +2930,7 @@
           <a:p>
             <a:fld id="{6E1A0613-6EBF-431F-A53F-186691F96B7D}" type="datetimeFigureOut">
               <a:rPr lang="en-BE" smtClean="0"/>
-              <a:t>14/09/2022</a:t>
+              <a:t>23/09/2023</a:t>
             </a:fld>
             <a:endParaRPr lang="en-BE"/>
           </a:p>
@@ -3968,7 +3973,7 @@
           <a:p>
             <a:r>
               <a:rPr lang="en-GB" sz="1200" dirty="0"/>
-              <a:t>Apache webserver + PHP 8.1</a:t>
+              <a:t>Apache webserver + PHP 8.2</a:t>
             </a:r>
             <a:endParaRPr lang="en-BE" sz="1200" dirty="0"/>
           </a:p>
@@ -4376,7 +4381,7 @@
           <a:p>
             <a:r>
               <a:rPr lang="en-GB" sz="1200" dirty="0"/>
-              <a:t>Apache webserver + PHP 8.1</a:t>
+              <a:t>Apache webserver + PHP 8.2</a:t>
             </a:r>
             <a:endParaRPr lang="en-BE" sz="1200" dirty="0"/>
           </a:p>
@@ -4773,7 +4778,7 @@
           <a:p>
             <a:r>
               <a:rPr lang="en-GB" sz="1200" dirty="0"/>
-              <a:t>Apache webserver + PHP 8.1</a:t>
+              <a:t>Apache webserver + PHP 8.2</a:t>
             </a:r>
             <a:endParaRPr lang="en-BE" sz="1200" dirty="0"/>
           </a:p>

</xml_diff>

<commit_message>
updating some version numbers and detail and slide series 02.docker
</commit_message>
<xml_diff>
--- a/app/public/assets/02/docker-dev-and-prod.pptx
+++ b/app/public/assets/02/docker-dev-and-prod.pptx
@@ -261,7 +261,7 @@
           <a:p>
             <a:fld id="{6E1A0613-6EBF-431F-A53F-186691F96B7D}" type="datetimeFigureOut">
               <a:rPr lang="en-BE" smtClean="0"/>
-              <a:t>23/09/2023</a:t>
+              <a:t>19/09/2024</a:t>
             </a:fld>
             <a:endParaRPr lang="en-BE"/>
           </a:p>
@@ -461,7 +461,7 @@
           <a:p>
             <a:fld id="{6E1A0613-6EBF-431F-A53F-186691F96B7D}" type="datetimeFigureOut">
               <a:rPr lang="en-BE" smtClean="0"/>
-              <a:t>23/09/2023</a:t>
+              <a:t>19/09/2024</a:t>
             </a:fld>
             <a:endParaRPr lang="en-BE"/>
           </a:p>
@@ -671,7 +671,7 @@
           <a:p>
             <a:fld id="{6E1A0613-6EBF-431F-A53F-186691F96B7D}" type="datetimeFigureOut">
               <a:rPr lang="en-BE" smtClean="0"/>
-              <a:t>23/09/2023</a:t>
+              <a:t>19/09/2024</a:t>
             </a:fld>
             <a:endParaRPr lang="en-BE"/>
           </a:p>
@@ -871,7 +871,7 @@
           <a:p>
             <a:fld id="{6E1A0613-6EBF-431F-A53F-186691F96B7D}" type="datetimeFigureOut">
               <a:rPr lang="en-BE" smtClean="0"/>
-              <a:t>23/09/2023</a:t>
+              <a:t>19/09/2024</a:t>
             </a:fld>
             <a:endParaRPr lang="en-BE"/>
           </a:p>
@@ -1147,7 +1147,7 @@
           <a:p>
             <a:fld id="{6E1A0613-6EBF-431F-A53F-186691F96B7D}" type="datetimeFigureOut">
               <a:rPr lang="en-BE" smtClean="0"/>
-              <a:t>23/09/2023</a:t>
+              <a:t>19/09/2024</a:t>
             </a:fld>
             <a:endParaRPr lang="en-BE"/>
           </a:p>
@@ -1415,7 +1415,7 @@
           <a:p>
             <a:fld id="{6E1A0613-6EBF-431F-A53F-186691F96B7D}" type="datetimeFigureOut">
               <a:rPr lang="en-BE" smtClean="0"/>
-              <a:t>23/09/2023</a:t>
+              <a:t>19/09/2024</a:t>
             </a:fld>
             <a:endParaRPr lang="en-BE"/>
           </a:p>
@@ -1830,7 +1830,7 @@
           <a:p>
             <a:fld id="{6E1A0613-6EBF-431F-A53F-186691F96B7D}" type="datetimeFigureOut">
               <a:rPr lang="en-BE" smtClean="0"/>
-              <a:t>23/09/2023</a:t>
+              <a:t>19/09/2024</a:t>
             </a:fld>
             <a:endParaRPr lang="en-BE"/>
           </a:p>
@@ -1972,7 +1972,7 @@
           <a:p>
             <a:fld id="{6E1A0613-6EBF-431F-A53F-186691F96B7D}" type="datetimeFigureOut">
               <a:rPr lang="en-BE" smtClean="0"/>
-              <a:t>23/09/2023</a:t>
+              <a:t>19/09/2024</a:t>
             </a:fld>
             <a:endParaRPr lang="en-BE"/>
           </a:p>
@@ -2085,7 +2085,7 @@
           <a:p>
             <a:fld id="{6E1A0613-6EBF-431F-A53F-186691F96B7D}" type="datetimeFigureOut">
               <a:rPr lang="en-BE" smtClean="0"/>
-              <a:t>23/09/2023</a:t>
+              <a:t>19/09/2024</a:t>
             </a:fld>
             <a:endParaRPr lang="en-BE"/>
           </a:p>
@@ -2398,7 +2398,7 @@
           <a:p>
             <a:fld id="{6E1A0613-6EBF-431F-A53F-186691F96B7D}" type="datetimeFigureOut">
               <a:rPr lang="en-BE" smtClean="0"/>
-              <a:t>23/09/2023</a:t>
+              <a:t>19/09/2024</a:t>
             </a:fld>
             <a:endParaRPr lang="en-BE"/>
           </a:p>
@@ -2687,7 +2687,7 @@
           <a:p>
             <a:fld id="{6E1A0613-6EBF-431F-A53F-186691F96B7D}" type="datetimeFigureOut">
               <a:rPr lang="en-BE" smtClean="0"/>
-              <a:t>23/09/2023</a:t>
+              <a:t>19/09/2024</a:t>
             </a:fld>
             <a:endParaRPr lang="en-BE"/>
           </a:p>
@@ -2930,7 +2930,7 @@
           <a:p>
             <a:fld id="{6E1A0613-6EBF-431F-A53F-186691F96B7D}" type="datetimeFigureOut">
               <a:rPr lang="en-BE" smtClean="0"/>
-              <a:t>23/09/2023</a:t>
+              <a:t>19/09/2024</a:t>
             </a:fld>
             <a:endParaRPr lang="en-BE"/>
           </a:p>
@@ -3814,7 +3814,7 @@
           <a:p>
             <a:r>
               <a:rPr lang="en-GB" sz="1200" dirty="0"/>
-              <a:t>MySQL 8.0 DBMS</a:t>
+              <a:t>MySQL 8.4 DBMS</a:t>
             </a:r>
             <a:endParaRPr lang="en-BE" sz="1200" dirty="0"/>
           </a:p>
@@ -3973,7 +3973,7 @@
           <a:p>
             <a:r>
               <a:rPr lang="en-GB" sz="1200" dirty="0"/>
-              <a:t>Apache webserver + PHP 8.2</a:t>
+              <a:t>Apache webserver + PHP 8.3</a:t>
             </a:r>
             <a:endParaRPr lang="en-BE" sz="1200" dirty="0"/>
           </a:p>
@@ -4258,7 +4258,7 @@
           <a:p>
             <a:r>
               <a:rPr lang="en-GB" sz="1200" dirty="0"/>
-              <a:t>MySQL 8.0 DBMS</a:t>
+              <a:t>MySQL 8.4 DBMS</a:t>
             </a:r>
             <a:endParaRPr lang="en-BE" sz="1200" dirty="0"/>
           </a:p>
@@ -4381,7 +4381,7 @@
           <a:p>
             <a:r>
               <a:rPr lang="en-GB" sz="1200" dirty="0"/>
-              <a:t>Apache webserver + PHP 8.2</a:t>
+              <a:t>Apache webserver + PHP 8.3</a:t>
             </a:r>
             <a:endParaRPr lang="en-BE" sz="1200" dirty="0"/>
           </a:p>
@@ -4742,7 +4742,7 @@
           <a:p>
             <a:r>
               <a:rPr lang="en-GB" sz="1200" dirty="0"/>
-              <a:t>MySQL 8.0 DBMS</a:t>
+              <a:t>MySQL 8.4 DBMS</a:t>
             </a:r>
             <a:endParaRPr lang="en-BE" sz="1200" dirty="0"/>
           </a:p>
@@ -4778,7 +4778,7 @@
           <a:p>
             <a:r>
               <a:rPr lang="en-GB" sz="1200" dirty="0"/>
-              <a:t>Apache webserver + PHP 8.2</a:t>
+              <a:t>Apache webserver + PHP 8.3</a:t>
             </a:r>
             <a:endParaRPr lang="en-BE" sz="1200" dirty="0"/>
           </a:p>

</xml_diff>